<commit_message>
PPt 2. és 1. hét
</commit_message>
<xml_diff>
--- a/Never Overtime.pptx
+++ b/Never Overtime.pptx
@@ -7,6 +7,8 @@
   <p:sldIdLst>
     <p:sldId id="256" r:id="rId2"/>
     <p:sldId id="257" r:id="rId3"/>
+    <p:sldId id="258" r:id="rId4"/>
+    <p:sldId id="259" r:id="rId5"/>
   </p:sldIdLst>
   <p:sldSz cx="12192000" cy="6858000"/>
   <p:notesSz cx="6858000" cy="9144000"/>
@@ -106,6 +108,18 @@
     </a:lvl9pPr>
   </p:defaultTextStyle>
   <p:extLst>
+    <p:ext uri="{521415D9-36F7-43E2-AB2F-B90AF26B5E84}">
+      <p14:sectionLst xmlns:p14="http://schemas.microsoft.com/office/powerpoint/2010/main">
+        <p14:section name="Alapértelmezett szakasz" id="{E1760261-8F10-4E67-A679-AA3FE866335F}">
+          <p14:sldIdLst>
+            <p14:sldId id="256"/>
+            <p14:sldId id="257"/>
+            <p14:sldId id="258"/>
+            <p14:sldId id="259"/>
+          </p14:sldIdLst>
+        </p14:section>
+      </p14:sectionLst>
+    </p:ext>
     <p:ext uri="{EFAFB233-063F-42B5-8137-9DF3F51BA10A}">
       <p15:sldGuideLst xmlns:p15="http://schemas.microsoft.com/office/powerpoint/2012/main"/>
     </p:ext>
@@ -260,7 +274,7 @@
           <a:p>
             <a:fld id="{2561417D-49AE-4FAC-BA02-90CCF03814E8}" type="datetimeFigureOut">
               <a:rPr lang="hu-HU" smtClean="0"/>
-              <a:t>2023. 05. 24.</a:t>
+              <a:t>2023. 05. 31.</a:t>
             </a:fld>
             <a:endParaRPr lang="hu-HU"/>
           </a:p>
@@ -458,7 +472,7 @@
           <a:p>
             <a:fld id="{2561417D-49AE-4FAC-BA02-90CCF03814E8}" type="datetimeFigureOut">
               <a:rPr lang="hu-HU" smtClean="0"/>
-              <a:t>2023. 05. 24.</a:t>
+              <a:t>2023. 05. 31.</a:t>
             </a:fld>
             <a:endParaRPr lang="hu-HU"/>
           </a:p>
@@ -666,7 +680,7 @@
           <a:p>
             <a:fld id="{2561417D-49AE-4FAC-BA02-90CCF03814E8}" type="datetimeFigureOut">
               <a:rPr lang="hu-HU" smtClean="0"/>
-              <a:t>2023. 05. 24.</a:t>
+              <a:t>2023. 05. 31.</a:t>
             </a:fld>
             <a:endParaRPr lang="hu-HU"/>
           </a:p>
@@ -864,7 +878,7 @@
           <a:p>
             <a:fld id="{2561417D-49AE-4FAC-BA02-90CCF03814E8}" type="datetimeFigureOut">
               <a:rPr lang="hu-HU" smtClean="0"/>
-              <a:t>2023. 05. 24.</a:t>
+              <a:t>2023. 05. 31.</a:t>
             </a:fld>
             <a:endParaRPr lang="hu-HU"/>
           </a:p>
@@ -1139,7 +1153,7 @@
           <a:p>
             <a:fld id="{2561417D-49AE-4FAC-BA02-90CCF03814E8}" type="datetimeFigureOut">
               <a:rPr lang="hu-HU" smtClean="0"/>
-              <a:t>2023. 05. 24.</a:t>
+              <a:t>2023. 05. 31.</a:t>
             </a:fld>
             <a:endParaRPr lang="hu-HU"/>
           </a:p>
@@ -1404,7 +1418,7 @@
           <a:p>
             <a:fld id="{2561417D-49AE-4FAC-BA02-90CCF03814E8}" type="datetimeFigureOut">
               <a:rPr lang="hu-HU" smtClean="0"/>
-              <a:t>2023. 05. 24.</a:t>
+              <a:t>2023. 05. 31.</a:t>
             </a:fld>
             <a:endParaRPr lang="hu-HU"/>
           </a:p>
@@ -1816,7 +1830,7 @@
           <a:p>
             <a:fld id="{2561417D-49AE-4FAC-BA02-90CCF03814E8}" type="datetimeFigureOut">
               <a:rPr lang="hu-HU" smtClean="0"/>
-              <a:t>2023. 05. 24.</a:t>
+              <a:t>2023. 05. 31.</a:t>
             </a:fld>
             <a:endParaRPr lang="hu-HU"/>
           </a:p>
@@ -1957,7 +1971,7 @@
           <a:p>
             <a:fld id="{2561417D-49AE-4FAC-BA02-90CCF03814E8}" type="datetimeFigureOut">
               <a:rPr lang="hu-HU" smtClean="0"/>
-              <a:t>2023. 05. 24.</a:t>
+              <a:t>2023. 05. 31.</a:t>
             </a:fld>
             <a:endParaRPr lang="hu-HU"/>
           </a:p>
@@ -2070,7 +2084,7 @@
           <a:p>
             <a:fld id="{2561417D-49AE-4FAC-BA02-90CCF03814E8}" type="datetimeFigureOut">
               <a:rPr lang="hu-HU" smtClean="0"/>
-              <a:t>2023. 05. 24.</a:t>
+              <a:t>2023. 05. 31.</a:t>
             </a:fld>
             <a:endParaRPr lang="hu-HU"/>
           </a:p>
@@ -2381,7 +2395,7 @@
           <a:p>
             <a:fld id="{2561417D-49AE-4FAC-BA02-90CCF03814E8}" type="datetimeFigureOut">
               <a:rPr lang="hu-HU" smtClean="0"/>
-              <a:t>2023. 05. 24.</a:t>
+              <a:t>2023. 05. 31.</a:t>
             </a:fld>
             <a:endParaRPr lang="hu-HU"/>
           </a:p>
@@ -2669,7 +2683,7 @@
           <a:p>
             <a:fld id="{2561417D-49AE-4FAC-BA02-90CCF03814E8}" type="datetimeFigureOut">
               <a:rPr lang="hu-HU" smtClean="0"/>
-              <a:t>2023. 05. 24.</a:t>
+              <a:t>2023. 05. 31.</a:t>
             </a:fld>
             <a:endParaRPr lang="hu-HU"/>
           </a:p>
@@ -2910,7 +2924,7 @@
           <a:p>
             <a:fld id="{2561417D-49AE-4FAC-BA02-90CCF03814E8}" type="datetimeFigureOut">
               <a:rPr lang="hu-HU" smtClean="0"/>
-              <a:t>2023. 05. 24.</a:t>
+              <a:t>2023. 05. 31.</a:t>
             </a:fld>
             <a:endParaRPr lang="hu-HU"/>
           </a:p>
@@ -3387,13 +3401,8 @@
           <a:p>
             <a:r>
               <a:rPr lang="hu-HU" dirty="0"/>
-              <a:t>Tagjai: Kulcsár Máté, Tóth </a:t>
-            </a:r>
-            <a:r>
-              <a:rPr lang="hu-HU"/>
-              <a:t>Kata Krisztina</a:t>
-            </a:r>
-            <a:endParaRPr lang="hu-HU" dirty="0"/>
+              <a:t>Tagjai: Kulcsár Máté, Tóth Kata Krisztina</a:t>
+            </a:r>
           </a:p>
         </p:txBody>
       </p:sp>
@@ -3407,6 +3416,18 @@
   <p:clrMapOvr>
     <a:masterClrMapping/>
   </p:clrMapOvr>
+  <mc:AlternateContent xmlns:mc="http://schemas.openxmlformats.org/markup-compatibility/2006">
+    <mc:Choice xmlns:p15="http://schemas.microsoft.com/office/powerpoint/2012/main" Requires="p15">
+      <p:transition xmlns:p14="http://schemas.microsoft.com/office/powerpoint/2010/main" spd="slow" p14:dur="2000">
+        <p15:prstTrans prst="fallOver"/>
+      </p:transition>
+    </mc:Choice>
+    <mc:Fallback>
+      <p:transition spd="slow">
+        <p:fade/>
+      </p:transition>
+    </mc:Fallback>
+  </mc:AlternateContent>
 </p:sld>
 </file>
 
@@ -3443,14 +3464,19 @@
             <p:ph type="title"/>
           </p:nvPr>
         </p:nvSpPr>
-        <p:spPr/>
+        <p:spPr>
+          <a:xfrm>
+            <a:off x="0" y="-10029"/>
+            <a:ext cx="10515600" cy="1325563"/>
+          </a:xfrm>
+        </p:spPr>
         <p:txBody>
           <a:bodyPr/>
           <a:lstStyle/>
           <a:p>
             <a:r>
               <a:rPr lang="hu-HU" dirty="0"/>
-              <a:t>1. hét</a:t>
+              <a:t>1. hét (Kezdetek)</a:t>
             </a:r>
           </a:p>
         </p:txBody>
@@ -3471,7 +3497,12 @@
             <p:ph idx="1"/>
           </p:nvPr>
         </p:nvSpPr>
-        <p:spPr/>
+        <p:spPr>
+          <a:xfrm>
+            <a:off x="0" y="1114511"/>
+            <a:ext cx="10515600" cy="4351338"/>
+          </a:xfrm>
+        </p:spPr>
         <p:txBody>
           <a:bodyPr/>
           <a:lstStyle/>
@@ -3495,6 +3526,20 @@
             <a:r>
               <a:rPr lang="hu-HU" dirty="0"/>
               <a:t>Oldalak linkelve</a:t>
+            </a:r>
+          </a:p>
+          <a:p>
+            <a:r>
+              <a:rPr lang="hu-HU" dirty="0"/>
+              <a:t>Sanyi és </a:t>
+            </a:r>
+            <a:r>
+              <a:rPr lang="hu-HU" dirty="0" err="1"/>
+              <a:t>Mano</a:t>
+            </a:r>
+            <a:r>
+              <a:rPr lang="hu-HU" dirty="0"/>
+              <a:t> HTML elkezdése</a:t>
             </a:r>
           </a:p>
         </p:txBody>
@@ -3629,6 +3674,2130 @@
   <p:clrMapOvr>
     <a:masterClrMapping/>
   </p:clrMapOvr>
+  <mc:AlternateContent xmlns:mc="http://schemas.openxmlformats.org/markup-compatibility/2006">
+    <mc:Choice xmlns:p159="http://schemas.microsoft.com/office/powerpoint/2015/09/main" Requires="p159">
+      <p:transition xmlns:p14="http://schemas.microsoft.com/office/powerpoint/2010/main" spd="slow" p14:dur="2000">
+        <p159:morph option="byObject"/>
+      </p:transition>
+    </mc:Choice>
+    <mc:Fallback>
+      <p:transition spd="slow">
+        <p:fade/>
+      </p:transition>
+    </mc:Fallback>
+  </mc:AlternateContent>
+  <p:timing>
+    <p:tnLst>
+      <p:par>
+        <p:cTn id="1" dur="indefinite" restart="never" nodeType="tmRoot">
+          <p:childTnLst>
+            <p:seq concurrent="1" nextAc="seek">
+              <p:cTn id="2" dur="indefinite" nodeType="mainSeq">
+                <p:childTnLst>
+                  <p:par>
+                    <p:cTn id="3" fill="hold">
+                      <p:stCondLst>
+                        <p:cond delay="indefinite"/>
+                      </p:stCondLst>
+                      <p:childTnLst>
+                        <p:par>
+                          <p:cTn id="4" fill="hold">
+                            <p:stCondLst>
+                              <p:cond delay="0"/>
+                            </p:stCondLst>
+                            <p:childTnLst>
+                              <p:par>
+                                <p:cTn id="5" presetID="2" presetClass="entr" presetSubtype="8" fill="hold" grpId="0" nodeType="clickEffect">
+                                  <p:stCondLst>
+                                    <p:cond delay="0"/>
+                                  </p:stCondLst>
+                                  <p:childTnLst>
+                                    <p:set>
+                                      <p:cBhvr>
+                                        <p:cTn id="6" dur="1" fill="hold">
+                                          <p:stCondLst>
+                                            <p:cond delay="0"/>
+                                          </p:stCondLst>
+                                        </p:cTn>
+                                        <p:tgtEl>
+                                          <p:spTgt spid="3">
+                                            <p:txEl>
+                                              <p:pRg st="0" end="0"/>
+                                            </p:txEl>
+                                          </p:spTgt>
+                                        </p:tgtEl>
+                                        <p:attrNameLst>
+                                          <p:attrName>style.visibility</p:attrName>
+                                        </p:attrNameLst>
+                                      </p:cBhvr>
+                                      <p:to>
+                                        <p:strVal val="visible"/>
+                                      </p:to>
+                                    </p:set>
+                                    <p:anim calcmode="lin" valueType="num">
+                                      <p:cBhvr additive="base">
+                                        <p:cTn id="7" dur="500" fill="hold"/>
+                                        <p:tgtEl>
+                                          <p:spTgt spid="3">
+                                            <p:txEl>
+                                              <p:pRg st="0" end="0"/>
+                                            </p:txEl>
+                                          </p:spTgt>
+                                        </p:tgtEl>
+                                        <p:attrNameLst>
+                                          <p:attrName>ppt_x</p:attrName>
+                                        </p:attrNameLst>
+                                      </p:cBhvr>
+                                      <p:tavLst>
+                                        <p:tav tm="0">
+                                          <p:val>
+                                            <p:strVal val="0-#ppt_w/2"/>
+                                          </p:val>
+                                        </p:tav>
+                                        <p:tav tm="100000">
+                                          <p:val>
+                                            <p:strVal val="#ppt_x"/>
+                                          </p:val>
+                                        </p:tav>
+                                      </p:tavLst>
+                                    </p:anim>
+                                    <p:anim calcmode="lin" valueType="num">
+                                      <p:cBhvr additive="base">
+                                        <p:cTn id="8" dur="500" fill="hold"/>
+                                        <p:tgtEl>
+                                          <p:spTgt spid="3">
+                                            <p:txEl>
+                                              <p:pRg st="0" end="0"/>
+                                            </p:txEl>
+                                          </p:spTgt>
+                                        </p:tgtEl>
+                                        <p:attrNameLst>
+                                          <p:attrName>ppt_y</p:attrName>
+                                        </p:attrNameLst>
+                                      </p:cBhvr>
+                                      <p:tavLst>
+                                        <p:tav tm="0">
+                                          <p:val>
+                                            <p:strVal val="#ppt_y"/>
+                                          </p:val>
+                                        </p:tav>
+                                        <p:tav tm="100000">
+                                          <p:val>
+                                            <p:strVal val="#ppt_y"/>
+                                          </p:val>
+                                        </p:tav>
+                                      </p:tavLst>
+                                    </p:anim>
+                                  </p:childTnLst>
+                                </p:cTn>
+                              </p:par>
+                            </p:childTnLst>
+                          </p:cTn>
+                        </p:par>
+                        <p:par>
+                          <p:cTn id="9" fill="hold">
+                            <p:stCondLst>
+                              <p:cond delay="500"/>
+                            </p:stCondLst>
+                            <p:childTnLst>
+                              <p:par>
+                                <p:cTn id="10" presetID="31" presetClass="entr" presetSubtype="0" fill="hold" nodeType="afterEffect">
+                                  <p:stCondLst>
+                                    <p:cond delay="0"/>
+                                  </p:stCondLst>
+                                  <p:childTnLst>
+                                    <p:set>
+                                      <p:cBhvr>
+                                        <p:cTn id="11" dur="1" fill="hold">
+                                          <p:stCondLst>
+                                            <p:cond delay="0"/>
+                                          </p:stCondLst>
+                                        </p:cTn>
+                                        <p:tgtEl>
+                                          <p:spTgt spid="4"/>
+                                        </p:tgtEl>
+                                        <p:attrNameLst>
+                                          <p:attrName>style.visibility</p:attrName>
+                                        </p:attrNameLst>
+                                      </p:cBhvr>
+                                      <p:to>
+                                        <p:strVal val="visible"/>
+                                      </p:to>
+                                    </p:set>
+                                    <p:anim calcmode="lin" valueType="num">
+                                      <p:cBhvr>
+                                        <p:cTn id="12" dur="1000" fill="hold"/>
+                                        <p:tgtEl>
+                                          <p:spTgt spid="4"/>
+                                        </p:tgtEl>
+                                        <p:attrNameLst>
+                                          <p:attrName>ppt_w</p:attrName>
+                                        </p:attrNameLst>
+                                      </p:cBhvr>
+                                      <p:tavLst>
+                                        <p:tav tm="0">
+                                          <p:val>
+                                            <p:fltVal val="0"/>
+                                          </p:val>
+                                        </p:tav>
+                                        <p:tav tm="100000">
+                                          <p:val>
+                                            <p:strVal val="#ppt_w"/>
+                                          </p:val>
+                                        </p:tav>
+                                      </p:tavLst>
+                                    </p:anim>
+                                    <p:anim calcmode="lin" valueType="num">
+                                      <p:cBhvr>
+                                        <p:cTn id="13" dur="1000" fill="hold"/>
+                                        <p:tgtEl>
+                                          <p:spTgt spid="4"/>
+                                        </p:tgtEl>
+                                        <p:attrNameLst>
+                                          <p:attrName>ppt_h</p:attrName>
+                                        </p:attrNameLst>
+                                      </p:cBhvr>
+                                      <p:tavLst>
+                                        <p:tav tm="0">
+                                          <p:val>
+                                            <p:fltVal val="0"/>
+                                          </p:val>
+                                        </p:tav>
+                                        <p:tav tm="100000">
+                                          <p:val>
+                                            <p:strVal val="#ppt_h"/>
+                                          </p:val>
+                                        </p:tav>
+                                      </p:tavLst>
+                                    </p:anim>
+                                    <p:anim calcmode="lin" valueType="num">
+                                      <p:cBhvr>
+                                        <p:cTn id="14" dur="1000" fill="hold"/>
+                                        <p:tgtEl>
+                                          <p:spTgt spid="4"/>
+                                        </p:tgtEl>
+                                        <p:attrNameLst>
+                                          <p:attrName>style.rotation</p:attrName>
+                                        </p:attrNameLst>
+                                      </p:cBhvr>
+                                      <p:tavLst>
+                                        <p:tav tm="0">
+                                          <p:val>
+                                            <p:fltVal val="90"/>
+                                          </p:val>
+                                        </p:tav>
+                                        <p:tav tm="100000">
+                                          <p:val>
+                                            <p:fltVal val="0"/>
+                                          </p:val>
+                                        </p:tav>
+                                      </p:tavLst>
+                                    </p:anim>
+                                    <p:animEffect transition="in" filter="fade">
+                                      <p:cBhvr>
+                                        <p:cTn id="15" dur="1000"/>
+                                        <p:tgtEl>
+                                          <p:spTgt spid="4"/>
+                                        </p:tgtEl>
+                                      </p:cBhvr>
+                                    </p:animEffect>
+                                  </p:childTnLst>
+                                </p:cTn>
+                              </p:par>
+                            </p:childTnLst>
+                          </p:cTn>
+                        </p:par>
+                      </p:childTnLst>
+                    </p:cTn>
+                  </p:par>
+                  <p:par>
+                    <p:cTn id="16" fill="hold">
+                      <p:stCondLst>
+                        <p:cond delay="indefinite"/>
+                      </p:stCondLst>
+                      <p:childTnLst>
+                        <p:par>
+                          <p:cTn id="17" fill="hold">
+                            <p:stCondLst>
+                              <p:cond delay="0"/>
+                            </p:stCondLst>
+                            <p:childTnLst>
+                              <p:par>
+                                <p:cTn id="18" presetID="2" presetClass="entr" presetSubtype="8" fill="hold" grpId="0" nodeType="clickEffect">
+                                  <p:stCondLst>
+                                    <p:cond delay="0"/>
+                                  </p:stCondLst>
+                                  <p:childTnLst>
+                                    <p:set>
+                                      <p:cBhvr>
+                                        <p:cTn id="19" dur="1" fill="hold">
+                                          <p:stCondLst>
+                                            <p:cond delay="0"/>
+                                          </p:stCondLst>
+                                        </p:cTn>
+                                        <p:tgtEl>
+                                          <p:spTgt spid="3">
+                                            <p:txEl>
+                                              <p:pRg st="1" end="1"/>
+                                            </p:txEl>
+                                          </p:spTgt>
+                                        </p:tgtEl>
+                                        <p:attrNameLst>
+                                          <p:attrName>style.visibility</p:attrName>
+                                        </p:attrNameLst>
+                                      </p:cBhvr>
+                                      <p:to>
+                                        <p:strVal val="visible"/>
+                                      </p:to>
+                                    </p:set>
+                                    <p:anim calcmode="lin" valueType="num">
+                                      <p:cBhvr additive="base">
+                                        <p:cTn id="20" dur="500" fill="hold"/>
+                                        <p:tgtEl>
+                                          <p:spTgt spid="3">
+                                            <p:txEl>
+                                              <p:pRg st="1" end="1"/>
+                                            </p:txEl>
+                                          </p:spTgt>
+                                        </p:tgtEl>
+                                        <p:attrNameLst>
+                                          <p:attrName>ppt_x</p:attrName>
+                                        </p:attrNameLst>
+                                      </p:cBhvr>
+                                      <p:tavLst>
+                                        <p:tav tm="0">
+                                          <p:val>
+                                            <p:strVal val="0-#ppt_w/2"/>
+                                          </p:val>
+                                        </p:tav>
+                                        <p:tav tm="100000">
+                                          <p:val>
+                                            <p:strVal val="#ppt_x"/>
+                                          </p:val>
+                                        </p:tav>
+                                      </p:tavLst>
+                                    </p:anim>
+                                    <p:anim calcmode="lin" valueType="num">
+                                      <p:cBhvr additive="base">
+                                        <p:cTn id="21" dur="500" fill="hold"/>
+                                        <p:tgtEl>
+                                          <p:spTgt spid="3">
+                                            <p:txEl>
+                                              <p:pRg st="1" end="1"/>
+                                            </p:txEl>
+                                          </p:spTgt>
+                                        </p:tgtEl>
+                                        <p:attrNameLst>
+                                          <p:attrName>ppt_y</p:attrName>
+                                        </p:attrNameLst>
+                                      </p:cBhvr>
+                                      <p:tavLst>
+                                        <p:tav tm="0">
+                                          <p:val>
+                                            <p:strVal val="#ppt_y"/>
+                                          </p:val>
+                                        </p:tav>
+                                        <p:tav tm="100000">
+                                          <p:val>
+                                            <p:strVal val="#ppt_y"/>
+                                          </p:val>
+                                        </p:tav>
+                                      </p:tavLst>
+                                    </p:anim>
+                                  </p:childTnLst>
+                                </p:cTn>
+                              </p:par>
+                            </p:childTnLst>
+                          </p:cTn>
+                        </p:par>
+                        <p:par>
+                          <p:cTn id="22" fill="hold">
+                            <p:stCondLst>
+                              <p:cond delay="500"/>
+                            </p:stCondLst>
+                            <p:childTnLst>
+                              <p:par>
+                                <p:cTn id="23" presetID="16" presetClass="entr" presetSubtype="42" fill="hold" nodeType="afterEffect">
+                                  <p:stCondLst>
+                                    <p:cond delay="0"/>
+                                  </p:stCondLst>
+                                  <p:childTnLst>
+                                    <p:set>
+                                      <p:cBhvr>
+                                        <p:cTn id="24" dur="1" fill="hold">
+                                          <p:stCondLst>
+                                            <p:cond delay="0"/>
+                                          </p:stCondLst>
+                                        </p:cTn>
+                                        <p:tgtEl>
+                                          <p:spTgt spid="6"/>
+                                        </p:tgtEl>
+                                        <p:attrNameLst>
+                                          <p:attrName>style.visibility</p:attrName>
+                                        </p:attrNameLst>
+                                      </p:cBhvr>
+                                      <p:to>
+                                        <p:strVal val="visible"/>
+                                      </p:to>
+                                    </p:set>
+                                    <p:animEffect transition="in" filter="barn(outHorizontal)">
+                                      <p:cBhvr>
+                                        <p:cTn id="25" dur="500"/>
+                                        <p:tgtEl>
+                                          <p:spTgt spid="6"/>
+                                        </p:tgtEl>
+                                      </p:cBhvr>
+                                    </p:animEffect>
+                                  </p:childTnLst>
+                                </p:cTn>
+                              </p:par>
+                            </p:childTnLst>
+                          </p:cTn>
+                        </p:par>
+                      </p:childTnLst>
+                    </p:cTn>
+                  </p:par>
+                  <p:par>
+                    <p:cTn id="26" fill="hold">
+                      <p:stCondLst>
+                        <p:cond delay="indefinite"/>
+                      </p:stCondLst>
+                      <p:childTnLst>
+                        <p:par>
+                          <p:cTn id="27" fill="hold">
+                            <p:stCondLst>
+                              <p:cond delay="0"/>
+                            </p:stCondLst>
+                            <p:childTnLst>
+                              <p:par>
+                                <p:cTn id="28" presetID="2" presetClass="entr" presetSubtype="8" fill="hold" grpId="0" nodeType="clickEffect">
+                                  <p:stCondLst>
+                                    <p:cond delay="0"/>
+                                  </p:stCondLst>
+                                  <p:childTnLst>
+                                    <p:set>
+                                      <p:cBhvr>
+                                        <p:cTn id="29" dur="1" fill="hold">
+                                          <p:stCondLst>
+                                            <p:cond delay="0"/>
+                                          </p:stCondLst>
+                                        </p:cTn>
+                                        <p:tgtEl>
+                                          <p:spTgt spid="3">
+                                            <p:txEl>
+                                              <p:pRg st="2" end="2"/>
+                                            </p:txEl>
+                                          </p:spTgt>
+                                        </p:tgtEl>
+                                        <p:attrNameLst>
+                                          <p:attrName>style.visibility</p:attrName>
+                                        </p:attrNameLst>
+                                      </p:cBhvr>
+                                      <p:to>
+                                        <p:strVal val="visible"/>
+                                      </p:to>
+                                    </p:set>
+                                    <p:anim calcmode="lin" valueType="num">
+                                      <p:cBhvr additive="base">
+                                        <p:cTn id="30" dur="500" fill="hold"/>
+                                        <p:tgtEl>
+                                          <p:spTgt spid="3">
+                                            <p:txEl>
+                                              <p:pRg st="2" end="2"/>
+                                            </p:txEl>
+                                          </p:spTgt>
+                                        </p:tgtEl>
+                                        <p:attrNameLst>
+                                          <p:attrName>ppt_x</p:attrName>
+                                        </p:attrNameLst>
+                                      </p:cBhvr>
+                                      <p:tavLst>
+                                        <p:tav tm="0">
+                                          <p:val>
+                                            <p:strVal val="0-#ppt_w/2"/>
+                                          </p:val>
+                                        </p:tav>
+                                        <p:tav tm="100000">
+                                          <p:val>
+                                            <p:strVal val="#ppt_x"/>
+                                          </p:val>
+                                        </p:tav>
+                                      </p:tavLst>
+                                    </p:anim>
+                                    <p:anim calcmode="lin" valueType="num">
+                                      <p:cBhvr additive="base">
+                                        <p:cTn id="31" dur="500" fill="hold"/>
+                                        <p:tgtEl>
+                                          <p:spTgt spid="3">
+                                            <p:txEl>
+                                              <p:pRg st="2" end="2"/>
+                                            </p:txEl>
+                                          </p:spTgt>
+                                        </p:tgtEl>
+                                        <p:attrNameLst>
+                                          <p:attrName>ppt_y</p:attrName>
+                                        </p:attrNameLst>
+                                      </p:cBhvr>
+                                      <p:tavLst>
+                                        <p:tav tm="0">
+                                          <p:val>
+                                            <p:strVal val="#ppt_y"/>
+                                          </p:val>
+                                        </p:tav>
+                                        <p:tav tm="100000">
+                                          <p:val>
+                                            <p:strVal val="#ppt_y"/>
+                                          </p:val>
+                                        </p:tav>
+                                      </p:tavLst>
+                                    </p:anim>
+                                  </p:childTnLst>
+                                </p:cTn>
+                              </p:par>
+                            </p:childTnLst>
+                          </p:cTn>
+                        </p:par>
+                        <p:par>
+                          <p:cTn id="32" fill="hold">
+                            <p:stCondLst>
+                              <p:cond delay="500"/>
+                            </p:stCondLst>
+                            <p:childTnLst>
+                              <p:par>
+                                <p:cTn id="33" presetID="22" presetClass="entr" presetSubtype="4" fill="hold" nodeType="afterEffect">
+                                  <p:stCondLst>
+                                    <p:cond delay="0"/>
+                                  </p:stCondLst>
+                                  <p:childTnLst>
+                                    <p:set>
+                                      <p:cBhvr>
+                                        <p:cTn id="34" dur="1" fill="hold">
+                                          <p:stCondLst>
+                                            <p:cond delay="0"/>
+                                          </p:stCondLst>
+                                        </p:cTn>
+                                        <p:tgtEl>
+                                          <p:spTgt spid="5"/>
+                                        </p:tgtEl>
+                                        <p:attrNameLst>
+                                          <p:attrName>style.visibility</p:attrName>
+                                        </p:attrNameLst>
+                                      </p:cBhvr>
+                                      <p:to>
+                                        <p:strVal val="visible"/>
+                                      </p:to>
+                                    </p:set>
+                                    <p:animEffect transition="in" filter="wipe(down)">
+                                      <p:cBhvr>
+                                        <p:cTn id="35" dur="500"/>
+                                        <p:tgtEl>
+                                          <p:spTgt spid="5"/>
+                                        </p:tgtEl>
+                                      </p:cBhvr>
+                                    </p:animEffect>
+                                  </p:childTnLst>
+                                </p:cTn>
+                              </p:par>
+                            </p:childTnLst>
+                          </p:cTn>
+                        </p:par>
+                      </p:childTnLst>
+                    </p:cTn>
+                  </p:par>
+                  <p:par>
+                    <p:cTn id="36" fill="hold">
+                      <p:stCondLst>
+                        <p:cond delay="indefinite"/>
+                      </p:stCondLst>
+                      <p:childTnLst>
+                        <p:par>
+                          <p:cTn id="37" fill="hold">
+                            <p:stCondLst>
+                              <p:cond delay="0"/>
+                            </p:stCondLst>
+                            <p:childTnLst>
+                              <p:par>
+                                <p:cTn id="38" presetID="2" presetClass="entr" presetSubtype="8" fill="hold" grpId="0" nodeType="clickEffect">
+                                  <p:stCondLst>
+                                    <p:cond delay="0"/>
+                                  </p:stCondLst>
+                                  <p:childTnLst>
+                                    <p:set>
+                                      <p:cBhvr>
+                                        <p:cTn id="39" dur="1" fill="hold">
+                                          <p:stCondLst>
+                                            <p:cond delay="0"/>
+                                          </p:stCondLst>
+                                        </p:cTn>
+                                        <p:tgtEl>
+                                          <p:spTgt spid="3">
+                                            <p:txEl>
+                                              <p:pRg st="3" end="3"/>
+                                            </p:txEl>
+                                          </p:spTgt>
+                                        </p:tgtEl>
+                                        <p:attrNameLst>
+                                          <p:attrName>style.visibility</p:attrName>
+                                        </p:attrNameLst>
+                                      </p:cBhvr>
+                                      <p:to>
+                                        <p:strVal val="visible"/>
+                                      </p:to>
+                                    </p:set>
+                                    <p:anim calcmode="lin" valueType="num">
+                                      <p:cBhvr additive="base">
+                                        <p:cTn id="40" dur="500" fill="hold"/>
+                                        <p:tgtEl>
+                                          <p:spTgt spid="3">
+                                            <p:txEl>
+                                              <p:pRg st="3" end="3"/>
+                                            </p:txEl>
+                                          </p:spTgt>
+                                        </p:tgtEl>
+                                        <p:attrNameLst>
+                                          <p:attrName>ppt_x</p:attrName>
+                                        </p:attrNameLst>
+                                      </p:cBhvr>
+                                      <p:tavLst>
+                                        <p:tav tm="0">
+                                          <p:val>
+                                            <p:strVal val="0-#ppt_w/2"/>
+                                          </p:val>
+                                        </p:tav>
+                                        <p:tav tm="100000">
+                                          <p:val>
+                                            <p:strVal val="#ppt_x"/>
+                                          </p:val>
+                                        </p:tav>
+                                      </p:tavLst>
+                                    </p:anim>
+                                    <p:anim calcmode="lin" valueType="num">
+                                      <p:cBhvr additive="base">
+                                        <p:cTn id="41" dur="500" fill="hold"/>
+                                        <p:tgtEl>
+                                          <p:spTgt spid="3">
+                                            <p:txEl>
+                                              <p:pRg st="3" end="3"/>
+                                            </p:txEl>
+                                          </p:spTgt>
+                                        </p:tgtEl>
+                                        <p:attrNameLst>
+                                          <p:attrName>ppt_y</p:attrName>
+                                        </p:attrNameLst>
+                                      </p:cBhvr>
+                                      <p:tavLst>
+                                        <p:tav tm="0">
+                                          <p:val>
+                                            <p:strVal val="#ppt_y"/>
+                                          </p:val>
+                                        </p:tav>
+                                        <p:tav tm="100000">
+                                          <p:val>
+                                            <p:strVal val="#ppt_y"/>
+                                          </p:val>
+                                        </p:tav>
+                                      </p:tavLst>
+                                    </p:anim>
+                                  </p:childTnLst>
+                                </p:cTn>
+                              </p:par>
+                            </p:childTnLst>
+                          </p:cTn>
+                        </p:par>
+                      </p:childTnLst>
+                    </p:cTn>
+                  </p:par>
+                </p:childTnLst>
+              </p:cTn>
+              <p:prevCondLst>
+                <p:cond evt="onPrev" delay="0">
+                  <p:tgtEl>
+                    <p:sldTgt/>
+                  </p:tgtEl>
+                </p:cond>
+              </p:prevCondLst>
+              <p:nextCondLst>
+                <p:cond evt="onNext" delay="0">
+                  <p:tgtEl>
+                    <p:sldTgt/>
+                  </p:tgtEl>
+                </p:cond>
+              </p:nextCondLst>
+            </p:seq>
+          </p:childTnLst>
+        </p:cTn>
+      </p:par>
+    </p:tnLst>
+    <p:bldLst>
+      <p:bldP spid="3" grpId="0" uiExpand="1" build="p"/>
+    </p:bldLst>
+  </p:timing>
+</p:sld>
+</file>
+
+<file path=ppt/slides/slide3.xml><?xml version="1.0" encoding="utf-8"?>
+<p:sld xmlns:a="http://schemas.openxmlformats.org/drawingml/2006/main" xmlns:r="http://schemas.openxmlformats.org/officeDocument/2006/relationships" xmlns:p="http://schemas.openxmlformats.org/presentationml/2006/main">
+  <p:cSld>
+    <p:spTree>
+      <p:nvGrpSpPr>
+        <p:cNvPr id="1" name=""/>
+        <p:cNvGrpSpPr/>
+        <p:nvPr/>
+      </p:nvGrpSpPr>
+      <p:grpSpPr>
+        <a:xfrm>
+          <a:off x="0" y="0"/>
+          <a:ext cx="0" cy="0"/>
+          <a:chOff x="0" y="0"/>
+          <a:chExt cx="0" cy="0"/>
+        </a:xfrm>
+      </p:grpSpPr>
+      <p:pic>
+        <p:nvPicPr>
+          <p:cNvPr id="5" name="Tartalom helye 4">
+            <a:extLst>
+              <a:ext uri="{FF2B5EF4-FFF2-40B4-BE49-F238E27FC236}">
+                <a16:creationId xmlns:a16="http://schemas.microsoft.com/office/drawing/2014/main" id="{695E61AE-D373-466A-8B4A-C03799C7FAA7}"/>
+              </a:ext>
+            </a:extLst>
+          </p:cNvPr>
+          <p:cNvPicPr>
+            <a:picLocks noGrp="1" noChangeAspect="1"/>
+          </p:cNvPicPr>
+          <p:nvPr>
+            <p:ph sz="half" idx="2"/>
+          </p:nvPr>
+        </p:nvPicPr>
+        <p:blipFill>
+          <a:blip r:embed="rId2"/>
+          <a:stretch>
+            <a:fillRect/>
+          </a:stretch>
+        </p:blipFill>
+        <p:spPr>
+          <a:xfrm>
+            <a:off x="5833533" y="2340821"/>
+            <a:ext cx="6362701" cy="4517179"/>
+          </a:xfrm>
+          <a:prstGeom prst="rect">
+            <a:avLst/>
+          </a:prstGeom>
+        </p:spPr>
+      </p:pic>
+      <p:sp>
+        <p:nvSpPr>
+          <p:cNvPr id="2" name="Cím 1">
+            <a:extLst>
+              <a:ext uri="{FF2B5EF4-FFF2-40B4-BE49-F238E27FC236}">
+                <a16:creationId xmlns:a16="http://schemas.microsoft.com/office/drawing/2014/main" id="{4E512DED-8330-4F5E-B276-1DBAB95B9474}"/>
+              </a:ext>
+            </a:extLst>
+          </p:cNvPr>
+          <p:cNvSpPr>
+            <a:spLocks noGrp="1"/>
+          </p:cNvSpPr>
+          <p:nvPr>
+            <p:ph type="title"/>
+          </p:nvPr>
+        </p:nvSpPr>
+        <p:spPr>
+          <a:xfrm>
+            <a:off x="0" y="0"/>
+            <a:ext cx="10515600" cy="1325563"/>
+          </a:xfrm>
+        </p:spPr>
+        <p:txBody>
+          <a:bodyPr/>
+          <a:lstStyle/>
+          <a:p>
+            <a:r>
+              <a:rPr lang="hu-HU" dirty="0"/>
+              <a:t>2. hét (A munka veleje)</a:t>
+            </a:r>
+          </a:p>
+        </p:txBody>
+      </p:sp>
+      <p:sp>
+        <p:nvSpPr>
+          <p:cNvPr id="3" name="Tartalom helye 2">
+            <a:extLst>
+              <a:ext uri="{FF2B5EF4-FFF2-40B4-BE49-F238E27FC236}">
+                <a16:creationId xmlns:a16="http://schemas.microsoft.com/office/drawing/2014/main" id="{1F351FBB-F530-4668-B0B7-08F159334A71}"/>
+              </a:ext>
+            </a:extLst>
+          </p:cNvPr>
+          <p:cNvSpPr>
+            <a:spLocks noGrp="1"/>
+          </p:cNvSpPr>
+          <p:nvPr>
+            <p:ph sz="half" idx="1"/>
+          </p:nvPr>
+        </p:nvSpPr>
+        <p:spPr>
+          <a:xfrm>
+            <a:off x="76200" y="1105958"/>
+            <a:ext cx="6019800" cy="4351338"/>
+          </a:xfrm>
+        </p:spPr>
+        <p:txBody>
+          <a:bodyPr/>
+          <a:lstStyle/>
+          <a:p>
+            <a:r>
+              <a:rPr lang="hu-HU" dirty="0"/>
+              <a:t>1. hét dokumentálása </a:t>
+            </a:r>
+            <a:r>
+              <a:rPr lang="hu-HU" dirty="0" err="1"/>
+              <a:t>PPt</a:t>
+            </a:r>
+            <a:r>
+              <a:rPr lang="hu-HU" dirty="0"/>
+              <a:t>-ben</a:t>
+            </a:r>
+          </a:p>
+          <a:p>
+            <a:r>
+              <a:rPr lang="hu-HU" dirty="0" err="1"/>
+              <a:t>Navbar</a:t>
+            </a:r>
+            <a:r>
+              <a:rPr lang="hu-HU" dirty="0"/>
+              <a:t> befejezése</a:t>
+            </a:r>
+          </a:p>
+          <a:p>
+            <a:r>
+              <a:rPr lang="hu-HU" dirty="0"/>
+              <a:t>Az összes HTML elkezdése (és néhány befejezése)</a:t>
+            </a:r>
+          </a:p>
+          <a:p>
+            <a:r>
+              <a:rPr lang="hu-HU" dirty="0"/>
+              <a:t>A weboldalak képekkel való ellátása</a:t>
+            </a:r>
+          </a:p>
+          <a:p>
+            <a:r>
+              <a:rPr lang="hu-HU" dirty="0" err="1"/>
+              <a:t>Scratch</a:t>
+            </a:r>
+            <a:r>
+              <a:rPr lang="hu-HU" dirty="0"/>
+              <a:t> projektek kódjainak </a:t>
+            </a:r>
+            <a:r>
+              <a:rPr lang="hu-HU" dirty="0" err="1"/>
+              <a:t>begyüjtése</a:t>
+            </a:r>
+            <a:endParaRPr lang="hu-HU" dirty="0"/>
+          </a:p>
+          <a:p>
+            <a:r>
+              <a:rPr lang="hu-HU" dirty="0"/>
+              <a:t>Első </a:t>
+            </a:r>
+            <a:r>
+              <a:rPr lang="hu-HU" dirty="0" err="1"/>
+              <a:t>conflict</a:t>
+            </a:r>
+            <a:r>
+              <a:rPr lang="hu-HU" dirty="0"/>
+              <a:t>/</a:t>
+            </a:r>
+            <a:r>
+              <a:rPr lang="hu-HU" dirty="0" err="1"/>
+              <a:t>conflict</a:t>
+            </a:r>
+            <a:r>
+              <a:rPr lang="hu-HU" dirty="0"/>
+              <a:t>-ok és azok feloldásai</a:t>
+            </a:r>
+          </a:p>
+        </p:txBody>
+      </p:sp>
+    </p:spTree>
+    <p:extLst>
+      <p:ext uri="{BB962C8B-B14F-4D97-AF65-F5344CB8AC3E}">
+        <p14:creationId xmlns:p14="http://schemas.microsoft.com/office/powerpoint/2010/main" val="4045338548"/>
+      </p:ext>
+    </p:extLst>
+  </p:cSld>
+  <p:clrMapOvr>
+    <a:masterClrMapping/>
+  </p:clrMapOvr>
+  <mc:AlternateContent xmlns:mc="http://schemas.openxmlformats.org/markup-compatibility/2006">
+    <mc:Choice xmlns:p159="http://schemas.microsoft.com/office/powerpoint/2015/09/main" Requires="p159">
+      <p:transition xmlns:p14="http://schemas.microsoft.com/office/powerpoint/2010/main" spd="slow" p14:dur="2000">
+        <p159:morph option="byObject"/>
+      </p:transition>
+    </mc:Choice>
+    <mc:Fallback>
+      <p:transition spd="slow">
+        <p:fade/>
+      </p:transition>
+    </mc:Fallback>
+  </mc:AlternateContent>
+  <p:timing>
+    <p:tnLst>
+      <p:par>
+        <p:cTn id="1" dur="indefinite" restart="never" nodeType="tmRoot">
+          <p:childTnLst>
+            <p:seq concurrent="1" nextAc="seek">
+              <p:cTn id="2" dur="indefinite" nodeType="mainSeq">
+                <p:childTnLst>
+                  <p:par>
+                    <p:cTn id="3" fill="hold">
+                      <p:stCondLst>
+                        <p:cond delay="indefinite"/>
+                      </p:stCondLst>
+                      <p:childTnLst>
+                        <p:par>
+                          <p:cTn id="4" fill="hold">
+                            <p:stCondLst>
+                              <p:cond delay="0"/>
+                            </p:stCondLst>
+                            <p:childTnLst>
+                              <p:par>
+                                <p:cTn id="5" presetID="2" presetClass="entr" presetSubtype="8" fill="hold" grpId="0" nodeType="clickEffect">
+                                  <p:stCondLst>
+                                    <p:cond delay="0"/>
+                                  </p:stCondLst>
+                                  <p:childTnLst>
+                                    <p:set>
+                                      <p:cBhvr>
+                                        <p:cTn id="6" dur="1" fill="hold">
+                                          <p:stCondLst>
+                                            <p:cond delay="0"/>
+                                          </p:stCondLst>
+                                        </p:cTn>
+                                        <p:tgtEl>
+                                          <p:spTgt spid="3">
+                                            <p:txEl>
+                                              <p:pRg st="0" end="0"/>
+                                            </p:txEl>
+                                          </p:spTgt>
+                                        </p:tgtEl>
+                                        <p:attrNameLst>
+                                          <p:attrName>style.visibility</p:attrName>
+                                        </p:attrNameLst>
+                                      </p:cBhvr>
+                                      <p:to>
+                                        <p:strVal val="visible"/>
+                                      </p:to>
+                                    </p:set>
+                                    <p:anim calcmode="lin" valueType="num">
+                                      <p:cBhvr additive="base">
+                                        <p:cTn id="7" dur="500" fill="hold"/>
+                                        <p:tgtEl>
+                                          <p:spTgt spid="3">
+                                            <p:txEl>
+                                              <p:pRg st="0" end="0"/>
+                                            </p:txEl>
+                                          </p:spTgt>
+                                        </p:tgtEl>
+                                        <p:attrNameLst>
+                                          <p:attrName>ppt_x</p:attrName>
+                                        </p:attrNameLst>
+                                      </p:cBhvr>
+                                      <p:tavLst>
+                                        <p:tav tm="0">
+                                          <p:val>
+                                            <p:strVal val="0-#ppt_w/2"/>
+                                          </p:val>
+                                        </p:tav>
+                                        <p:tav tm="100000">
+                                          <p:val>
+                                            <p:strVal val="#ppt_x"/>
+                                          </p:val>
+                                        </p:tav>
+                                      </p:tavLst>
+                                    </p:anim>
+                                    <p:anim calcmode="lin" valueType="num">
+                                      <p:cBhvr additive="base">
+                                        <p:cTn id="8" dur="500" fill="hold"/>
+                                        <p:tgtEl>
+                                          <p:spTgt spid="3">
+                                            <p:txEl>
+                                              <p:pRg st="0" end="0"/>
+                                            </p:txEl>
+                                          </p:spTgt>
+                                        </p:tgtEl>
+                                        <p:attrNameLst>
+                                          <p:attrName>ppt_y</p:attrName>
+                                        </p:attrNameLst>
+                                      </p:cBhvr>
+                                      <p:tavLst>
+                                        <p:tav tm="0">
+                                          <p:val>
+                                            <p:strVal val="#ppt_y"/>
+                                          </p:val>
+                                        </p:tav>
+                                        <p:tav tm="100000">
+                                          <p:val>
+                                            <p:strVal val="#ppt_y"/>
+                                          </p:val>
+                                        </p:tav>
+                                      </p:tavLst>
+                                    </p:anim>
+                                  </p:childTnLst>
+                                </p:cTn>
+                              </p:par>
+                            </p:childTnLst>
+                          </p:cTn>
+                        </p:par>
+                      </p:childTnLst>
+                    </p:cTn>
+                  </p:par>
+                  <p:par>
+                    <p:cTn id="9" fill="hold">
+                      <p:stCondLst>
+                        <p:cond delay="indefinite"/>
+                      </p:stCondLst>
+                      <p:childTnLst>
+                        <p:par>
+                          <p:cTn id="10" fill="hold">
+                            <p:stCondLst>
+                              <p:cond delay="0"/>
+                            </p:stCondLst>
+                            <p:childTnLst>
+                              <p:par>
+                                <p:cTn id="11" presetID="2" presetClass="entr" presetSubtype="8" fill="hold" grpId="0" nodeType="clickEffect">
+                                  <p:stCondLst>
+                                    <p:cond delay="0"/>
+                                  </p:stCondLst>
+                                  <p:childTnLst>
+                                    <p:set>
+                                      <p:cBhvr>
+                                        <p:cTn id="12" dur="1" fill="hold">
+                                          <p:stCondLst>
+                                            <p:cond delay="0"/>
+                                          </p:stCondLst>
+                                        </p:cTn>
+                                        <p:tgtEl>
+                                          <p:spTgt spid="3">
+                                            <p:txEl>
+                                              <p:pRg st="1" end="1"/>
+                                            </p:txEl>
+                                          </p:spTgt>
+                                        </p:tgtEl>
+                                        <p:attrNameLst>
+                                          <p:attrName>style.visibility</p:attrName>
+                                        </p:attrNameLst>
+                                      </p:cBhvr>
+                                      <p:to>
+                                        <p:strVal val="visible"/>
+                                      </p:to>
+                                    </p:set>
+                                    <p:anim calcmode="lin" valueType="num">
+                                      <p:cBhvr additive="base">
+                                        <p:cTn id="13" dur="500" fill="hold"/>
+                                        <p:tgtEl>
+                                          <p:spTgt spid="3">
+                                            <p:txEl>
+                                              <p:pRg st="1" end="1"/>
+                                            </p:txEl>
+                                          </p:spTgt>
+                                        </p:tgtEl>
+                                        <p:attrNameLst>
+                                          <p:attrName>ppt_x</p:attrName>
+                                        </p:attrNameLst>
+                                      </p:cBhvr>
+                                      <p:tavLst>
+                                        <p:tav tm="0">
+                                          <p:val>
+                                            <p:strVal val="0-#ppt_w/2"/>
+                                          </p:val>
+                                        </p:tav>
+                                        <p:tav tm="100000">
+                                          <p:val>
+                                            <p:strVal val="#ppt_x"/>
+                                          </p:val>
+                                        </p:tav>
+                                      </p:tavLst>
+                                    </p:anim>
+                                    <p:anim calcmode="lin" valueType="num">
+                                      <p:cBhvr additive="base">
+                                        <p:cTn id="14" dur="500" fill="hold"/>
+                                        <p:tgtEl>
+                                          <p:spTgt spid="3">
+                                            <p:txEl>
+                                              <p:pRg st="1" end="1"/>
+                                            </p:txEl>
+                                          </p:spTgt>
+                                        </p:tgtEl>
+                                        <p:attrNameLst>
+                                          <p:attrName>ppt_y</p:attrName>
+                                        </p:attrNameLst>
+                                      </p:cBhvr>
+                                      <p:tavLst>
+                                        <p:tav tm="0">
+                                          <p:val>
+                                            <p:strVal val="#ppt_y"/>
+                                          </p:val>
+                                        </p:tav>
+                                        <p:tav tm="100000">
+                                          <p:val>
+                                            <p:strVal val="#ppt_y"/>
+                                          </p:val>
+                                        </p:tav>
+                                      </p:tavLst>
+                                    </p:anim>
+                                  </p:childTnLst>
+                                </p:cTn>
+                              </p:par>
+                            </p:childTnLst>
+                          </p:cTn>
+                        </p:par>
+                      </p:childTnLst>
+                    </p:cTn>
+                  </p:par>
+                  <p:par>
+                    <p:cTn id="15" fill="hold">
+                      <p:stCondLst>
+                        <p:cond delay="indefinite"/>
+                      </p:stCondLst>
+                      <p:childTnLst>
+                        <p:par>
+                          <p:cTn id="16" fill="hold">
+                            <p:stCondLst>
+                              <p:cond delay="0"/>
+                            </p:stCondLst>
+                            <p:childTnLst>
+                              <p:par>
+                                <p:cTn id="17" presetID="2" presetClass="entr" presetSubtype="8" fill="hold" grpId="0" nodeType="clickEffect">
+                                  <p:stCondLst>
+                                    <p:cond delay="0"/>
+                                  </p:stCondLst>
+                                  <p:childTnLst>
+                                    <p:set>
+                                      <p:cBhvr>
+                                        <p:cTn id="18" dur="1" fill="hold">
+                                          <p:stCondLst>
+                                            <p:cond delay="0"/>
+                                          </p:stCondLst>
+                                        </p:cTn>
+                                        <p:tgtEl>
+                                          <p:spTgt spid="3">
+                                            <p:txEl>
+                                              <p:pRg st="2" end="2"/>
+                                            </p:txEl>
+                                          </p:spTgt>
+                                        </p:tgtEl>
+                                        <p:attrNameLst>
+                                          <p:attrName>style.visibility</p:attrName>
+                                        </p:attrNameLst>
+                                      </p:cBhvr>
+                                      <p:to>
+                                        <p:strVal val="visible"/>
+                                      </p:to>
+                                    </p:set>
+                                    <p:anim calcmode="lin" valueType="num">
+                                      <p:cBhvr additive="base">
+                                        <p:cTn id="19" dur="500" fill="hold"/>
+                                        <p:tgtEl>
+                                          <p:spTgt spid="3">
+                                            <p:txEl>
+                                              <p:pRg st="2" end="2"/>
+                                            </p:txEl>
+                                          </p:spTgt>
+                                        </p:tgtEl>
+                                        <p:attrNameLst>
+                                          <p:attrName>ppt_x</p:attrName>
+                                        </p:attrNameLst>
+                                      </p:cBhvr>
+                                      <p:tavLst>
+                                        <p:tav tm="0">
+                                          <p:val>
+                                            <p:strVal val="0-#ppt_w/2"/>
+                                          </p:val>
+                                        </p:tav>
+                                        <p:tav tm="100000">
+                                          <p:val>
+                                            <p:strVal val="#ppt_x"/>
+                                          </p:val>
+                                        </p:tav>
+                                      </p:tavLst>
+                                    </p:anim>
+                                    <p:anim calcmode="lin" valueType="num">
+                                      <p:cBhvr additive="base">
+                                        <p:cTn id="20" dur="500" fill="hold"/>
+                                        <p:tgtEl>
+                                          <p:spTgt spid="3">
+                                            <p:txEl>
+                                              <p:pRg st="2" end="2"/>
+                                            </p:txEl>
+                                          </p:spTgt>
+                                        </p:tgtEl>
+                                        <p:attrNameLst>
+                                          <p:attrName>ppt_y</p:attrName>
+                                        </p:attrNameLst>
+                                      </p:cBhvr>
+                                      <p:tavLst>
+                                        <p:tav tm="0">
+                                          <p:val>
+                                            <p:strVal val="#ppt_y"/>
+                                          </p:val>
+                                        </p:tav>
+                                        <p:tav tm="100000">
+                                          <p:val>
+                                            <p:strVal val="#ppt_y"/>
+                                          </p:val>
+                                        </p:tav>
+                                      </p:tavLst>
+                                    </p:anim>
+                                  </p:childTnLst>
+                                </p:cTn>
+                              </p:par>
+                            </p:childTnLst>
+                          </p:cTn>
+                        </p:par>
+                      </p:childTnLst>
+                    </p:cTn>
+                  </p:par>
+                  <p:par>
+                    <p:cTn id="21" fill="hold">
+                      <p:stCondLst>
+                        <p:cond delay="indefinite"/>
+                      </p:stCondLst>
+                      <p:childTnLst>
+                        <p:par>
+                          <p:cTn id="22" fill="hold">
+                            <p:stCondLst>
+                              <p:cond delay="0"/>
+                            </p:stCondLst>
+                            <p:childTnLst>
+                              <p:par>
+                                <p:cTn id="23" presetID="2" presetClass="entr" presetSubtype="8" fill="hold" grpId="0" nodeType="clickEffect">
+                                  <p:stCondLst>
+                                    <p:cond delay="0"/>
+                                  </p:stCondLst>
+                                  <p:childTnLst>
+                                    <p:set>
+                                      <p:cBhvr>
+                                        <p:cTn id="24" dur="1" fill="hold">
+                                          <p:stCondLst>
+                                            <p:cond delay="0"/>
+                                          </p:stCondLst>
+                                        </p:cTn>
+                                        <p:tgtEl>
+                                          <p:spTgt spid="3">
+                                            <p:txEl>
+                                              <p:pRg st="3" end="3"/>
+                                            </p:txEl>
+                                          </p:spTgt>
+                                        </p:tgtEl>
+                                        <p:attrNameLst>
+                                          <p:attrName>style.visibility</p:attrName>
+                                        </p:attrNameLst>
+                                      </p:cBhvr>
+                                      <p:to>
+                                        <p:strVal val="visible"/>
+                                      </p:to>
+                                    </p:set>
+                                    <p:anim calcmode="lin" valueType="num">
+                                      <p:cBhvr additive="base">
+                                        <p:cTn id="25" dur="500" fill="hold"/>
+                                        <p:tgtEl>
+                                          <p:spTgt spid="3">
+                                            <p:txEl>
+                                              <p:pRg st="3" end="3"/>
+                                            </p:txEl>
+                                          </p:spTgt>
+                                        </p:tgtEl>
+                                        <p:attrNameLst>
+                                          <p:attrName>ppt_x</p:attrName>
+                                        </p:attrNameLst>
+                                      </p:cBhvr>
+                                      <p:tavLst>
+                                        <p:tav tm="0">
+                                          <p:val>
+                                            <p:strVal val="0-#ppt_w/2"/>
+                                          </p:val>
+                                        </p:tav>
+                                        <p:tav tm="100000">
+                                          <p:val>
+                                            <p:strVal val="#ppt_x"/>
+                                          </p:val>
+                                        </p:tav>
+                                      </p:tavLst>
+                                    </p:anim>
+                                    <p:anim calcmode="lin" valueType="num">
+                                      <p:cBhvr additive="base">
+                                        <p:cTn id="26" dur="500" fill="hold"/>
+                                        <p:tgtEl>
+                                          <p:spTgt spid="3">
+                                            <p:txEl>
+                                              <p:pRg st="3" end="3"/>
+                                            </p:txEl>
+                                          </p:spTgt>
+                                        </p:tgtEl>
+                                        <p:attrNameLst>
+                                          <p:attrName>ppt_y</p:attrName>
+                                        </p:attrNameLst>
+                                      </p:cBhvr>
+                                      <p:tavLst>
+                                        <p:tav tm="0">
+                                          <p:val>
+                                            <p:strVal val="#ppt_y"/>
+                                          </p:val>
+                                        </p:tav>
+                                        <p:tav tm="100000">
+                                          <p:val>
+                                            <p:strVal val="#ppt_y"/>
+                                          </p:val>
+                                        </p:tav>
+                                      </p:tavLst>
+                                    </p:anim>
+                                  </p:childTnLst>
+                                </p:cTn>
+                              </p:par>
+                            </p:childTnLst>
+                          </p:cTn>
+                        </p:par>
+                      </p:childTnLst>
+                    </p:cTn>
+                  </p:par>
+                  <p:par>
+                    <p:cTn id="27" fill="hold">
+                      <p:stCondLst>
+                        <p:cond delay="indefinite"/>
+                      </p:stCondLst>
+                      <p:childTnLst>
+                        <p:par>
+                          <p:cTn id="28" fill="hold">
+                            <p:stCondLst>
+                              <p:cond delay="0"/>
+                            </p:stCondLst>
+                            <p:childTnLst>
+                              <p:par>
+                                <p:cTn id="29" presetID="2" presetClass="entr" presetSubtype="8" fill="hold" grpId="0" nodeType="clickEffect">
+                                  <p:stCondLst>
+                                    <p:cond delay="0"/>
+                                  </p:stCondLst>
+                                  <p:childTnLst>
+                                    <p:set>
+                                      <p:cBhvr>
+                                        <p:cTn id="30" dur="1" fill="hold">
+                                          <p:stCondLst>
+                                            <p:cond delay="0"/>
+                                          </p:stCondLst>
+                                        </p:cTn>
+                                        <p:tgtEl>
+                                          <p:spTgt spid="3">
+                                            <p:txEl>
+                                              <p:pRg st="4" end="4"/>
+                                            </p:txEl>
+                                          </p:spTgt>
+                                        </p:tgtEl>
+                                        <p:attrNameLst>
+                                          <p:attrName>style.visibility</p:attrName>
+                                        </p:attrNameLst>
+                                      </p:cBhvr>
+                                      <p:to>
+                                        <p:strVal val="visible"/>
+                                      </p:to>
+                                    </p:set>
+                                    <p:anim calcmode="lin" valueType="num">
+                                      <p:cBhvr additive="base">
+                                        <p:cTn id="31" dur="500" fill="hold"/>
+                                        <p:tgtEl>
+                                          <p:spTgt spid="3">
+                                            <p:txEl>
+                                              <p:pRg st="4" end="4"/>
+                                            </p:txEl>
+                                          </p:spTgt>
+                                        </p:tgtEl>
+                                        <p:attrNameLst>
+                                          <p:attrName>ppt_x</p:attrName>
+                                        </p:attrNameLst>
+                                      </p:cBhvr>
+                                      <p:tavLst>
+                                        <p:tav tm="0">
+                                          <p:val>
+                                            <p:strVal val="0-#ppt_w/2"/>
+                                          </p:val>
+                                        </p:tav>
+                                        <p:tav tm="100000">
+                                          <p:val>
+                                            <p:strVal val="#ppt_x"/>
+                                          </p:val>
+                                        </p:tav>
+                                      </p:tavLst>
+                                    </p:anim>
+                                    <p:anim calcmode="lin" valueType="num">
+                                      <p:cBhvr additive="base">
+                                        <p:cTn id="32" dur="500" fill="hold"/>
+                                        <p:tgtEl>
+                                          <p:spTgt spid="3">
+                                            <p:txEl>
+                                              <p:pRg st="4" end="4"/>
+                                            </p:txEl>
+                                          </p:spTgt>
+                                        </p:tgtEl>
+                                        <p:attrNameLst>
+                                          <p:attrName>ppt_y</p:attrName>
+                                        </p:attrNameLst>
+                                      </p:cBhvr>
+                                      <p:tavLst>
+                                        <p:tav tm="0">
+                                          <p:val>
+                                            <p:strVal val="#ppt_y"/>
+                                          </p:val>
+                                        </p:tav>
+                                        <p:tav tm="100000">
+                                          <p:val>
+                                            <p:strVal val="#ppt_y"/>
+                                          </p:val>
+                                        </p:tav>
+                                      </p:tavLst>
+                                    </p:anim>
+                                  </p:childTnLst>
+                                </p:cTn>
+                              </p:par>
+                            </p:childTnLst>
+                          </p:cTn>
+                        </p:par>
+                      </p:childTnLst>
+                    </p:cTn>
+                  </p:par>
+                  <p:par>
+                    <p:cTn id="33" fill="hold">
+                      <p:stCondLst>
+                        <p:cond delay="indefinite"/>
+                      </p:stCondLst>
+                      <p:childTnLst>
+                        <p:par>
+                          <p:cTn id="34" fill="hold">
+                            <p:stCondLst>
+                              <p:cond delay="0"/>
+                            </p:stCondLst>
+                            <p:childTnLst>
+                              <p:par>
+                                <p:cTn id="35" presetID="2" presetClass="entr" presetSubtype="8" fill="hold" grpId="0" nodeType="clickEffect">
+                                  <p:stCondLst>
+                                    <p:cond delay="0"/>
+                                  </p:stCondLst>
+                                  <p:childTnLst>
+                                    <p:set>
+                                      <p:cBhvr>
+                                        <p:cTn id="36" dur="1" fill="hold">
+                                          <p:stCondLst>
+                                            <p:cond delay="0"/>
+                                          </p:stCondLst>
+                                        </p:cTn>
+                                        <p:tgtEl>
+                                          <p:spTgt spid="3">
+                                            <p:txEl>
+                                              <p:pRg st="5" end="5"/>
+                                            </p:txEl>
+                                          </p:spTgt>
+                                        </p:tgtEl>
+                                        <p:attrNameLst>
+                                          <p:attrName>style.visibility</p:attrName>
+                                        </p:attrNameLst>
+                                      </p:cBhvr>
+                                      <p:to>
+                                        <p:strVal val="visible"/>
+                                      </p:to>
+                                    </p:set>
+                                    <p:anim calcmode="lin" valueType="num">
+                                      <p:cBhvr additive="base">
+                                        <p:cTn id="37" dur="500" fill="hold"/>
+                                        <p:tgtEl>
+                                          <p:spTgt spid="3">
+                                            <p:txEl>
+                                              <p:pRg st="5" end="5"/>
+                                            </p:txEl>
+                                          </p:spTgt>
+                                        </p:tgtEl>
+                                        <p:attrNameLst>
+                                          <p:attrName>ppt_x</p:attrName>
+                                        </p:attrNameLst>
+                                      </p:cBhvr>
+                                      <p:tavLst>
+                                        <p:tav tm="0">
+                                          <p:val>
+                                            <p:strVal val="0-#ppt_w/2"/>
+                                          </p:val>
+                                        </p:tav>
+                                        <p:tav tm="100000">
+                                          <p:val>
+                                            <p:strVal val="#ppt_x"/>
+                                          </p:val>
+                                        </p:tav>
+                                      </p:tavLst>
+                                    </p:anim>
+                                    <p:anim calcmode="lin" valueType="num">
+                                      <p:cBhvr additive="base">
+                                        <p:cTn id="38" dur="500" fill="hold"/>
+                                        <p:tgtEl>
+                                          <p:spTgt spid="3">
+                                            <p:txEl>
+                                              <p:pRg st="5" end="5"/>
+                                            </p:txEl>
+                                          </p:spTgt>
+                                        </p:tgtEl>
+                                        <p:attrNameLst>
+                                          <p:attrName>ppt_y</p:attrName>
+                                        </p:attrNameLst>
+                                      </p:cBhvr>
+                                      <p:tavLst>
+                                        <p:tav tm="0">
+                                          <p:val>
+                                            <p:strVal val="#ppt_y"/>
+                                          </p:val>
+                                        </p:tav>
+                                        <p:tav tm="100000">
+                                          <p:val>
+                                            <p:strVal val="#ppt_y"/>
+                                          </p:val>
+                                        </p:tav>
+                                      </p:tavLst>
+                                    </p:anim>
+                                  </p:childTnLst>
+                                </p:cTn>
+                              </p:par>
+                            </p:childTnLst>
+                          </p:cTn>
+                        </p:par>
+                      </p:childTnLst>
+                    </p:cTn>
+                  </p:par>
+                </p:childTnLst>
+              </p:cTn>
+              <p:prevCondLst>
+                <p:cond evt="onPrev" delay="0">
+                  <p:tgtEl>
+                    <p:sldTgt/>
+                  </p:tgtEl>
+                </p:cond>
+              </p:prevCondLst>
+              <p:nextCondLst>
+                <p:cond evt="onNext" delay="0">
+                  <p:tgtEl>
+                    <p:sldTgt/>
+                  </p:tgtEl>
+                </p:cond>
+              </p:nextCondLst>
+            </p:seq>
+          </p:childTnLst>
+        </p:cTn>
+      </p:par>
+    </p:tnLst>
+    <p:bldLst>
+      <p:bldP spid="3" grpId="0" build="p"/>
+    </p:bldLst>
+  </p:timing>
+</p:sld>
+</file>
+
+<file path=ppt/slides/slide4.xml><?xml version="1.0" encoding="utf-8"?>
+<p:sld xmlns:a="http://schemas.openxmlformats.org/drawingml/2006/main" xmlns:r="http://schemas.openxmlformats.org/officeDocument/2006/relationships" xmlns:p="http://schemas.openxmlformats.org/presentationml/2006/main">
+  <p:cSld>
+    <p:spTree>
+      <p:nvGrpSpPr>
+        <p:cNvPr id="1" name=""/>
+        <p:cNvGrpSpPr/>
+        <p:nvPr/>
+      </p:nvGrpSpPr>
+      <p:grpSpPr>
+        <a:xfrm>
+          <a:off x="0" y="0"/>
+          <a:ext cx="0" cy="0"/>
+          <a:chOff x="0" y="0"/>
+          <a:chExt cx="0" cy="0"/>
+        </a:xfrm>
+      </p:grpSpPr>
+      <p:sp>
+        <p:nvSpPr>
+          <p:cNvPr id="2" name="Cím 1">
+            <a:extLst>
+              <a:ext uri="{FF2B5EF4-FFF2-40B4-BE49-F238E27FC236}">
+                <a16:creationId xmlns:a16="http://schemas.microsoft.com/office/drawing/2014/main" id="{31102D89-C529-41DC-B687-B3C7B4A76FA1}"/>
+              </a:ext>
+            </a:extLst>
+          </p:cNvPr>
+          <p:cNvSpPr>
+            <a:spLocks noGrp="1"/>
+          </p:cNvSpPr>
+          <p:nvPr>
+            <p:ph type="title"/>
+          </p:nvPr>
+        </p:nvSpPr>
+        <p:spPr>
+          <a:xfrm>
+            <a:off x="0" y="0"/>
+            <a:ext cx="10515600" cy="1325563"/>
+          </a:xfrm>
+        </p:spPr>
+        <p:txBody>
+          <a:bodyPr/>
+          <a:lstStyle/>
+          <a:p>
+            <a:r>
+              <a:rPr lang="hu-HU" dirty="0"/>
+              <a:t>3. hét (Csiszolás és befejezés)</a:t>
+            </a:r>
+          </a:p>
+        </p:txBody>
+      </p:sp>
+      <p:sp>
+        <p:nvSpPr>
+          <p:cNvPr id="3" name="Tartalom helye 2">
+            <a:extLst>
+              <a:ext uri="{FF2B5EF4-FFF2-40B4-BE49-F238E27FC236}">
+                <a16:creationId xmlns:a16="http://schemas.microsoft.com/office/drawing/2014/main" id="{805D91C1-1F28-4588-9B05-AC7E6555A26A}"/>
+              </a:ext>
+            </a:extLst>
+          </p:cNvPr>
+          <p:cNvSpPr>
+            <a:spLocks noGrp="1"/>
+          </p:cNvSpPr>
+          <p:nvPr>
+            <p:ph sz="half" idx="1"/>
+          </p:nvPr>
+        </p:nvSpPr>
+        <p:spPr>
+          <a:xfrm>
+            <a:off x="0" y="1325563"/>
+            <a:ext cx="5181600" cy="4351338"/>
+          </a:xfrm>
+        </p:spPr>
+        <p:txBody>
+          <a:bodyPr/>
+          <a:lstStyle/>
+          <a:p>
+            <a:r>
+              <a:rPr lang="hu-HU" dirty="0"/>
+              <a:t>2. hét dokumentálása </a:t>
+            </a:r>
+            <a:r>
+              <a:rPr lang="hu-HU" dirty="0" err="1"/>
+              <a:t>PPt</a:t>
+            </a:r>
+            <a:r>
+              <a:rPr lang="hu-HU" dirty="0"/>
+              <a:t>-ben</a:t>
+            </a:r>
+          </a:p>
+          <a:p>
+            <a:r>
+              <a:rPr lang="hu-HU" dirty="0"/>
+              <a:t>A maradék HTML-ek befejezése</a:t>
+            </a:r>
+          </a:p>
+          <a:p>
+            <a:r>
+              <a:rPr lang="hu-HU" dirty="0" err="1"/>
+              <a:t>Responsivitás</a:t>
+            </a:r>
+            <a:r>
+              <a:rPr lang="hu-HU" dirty="0"/>
+              <a:t> elintézése</a:t>
+            </a:r>
+          </a:p>
+          <a:p>
+            <a:r>
+              <a:rPr lang="hu-HU" dirty="0"/>
+              <a:t>Főoldal elkészítése?</a:t>
+            </a:r>
+          </a:p>
+        </p:txBody>
+      </p:sp>
+      <p:sp>
+        <p:nvSpPr>
+          <p:cNvPr id="4" name="Tartalom helye 3">
+            <a:extLst>
+              <a:ext uri="{FF2B5EF4-FFF2-40B4-BE49-F238E27FC236}">
+                <a16:creationId xmlns:a16="http://schemas.microsoft.com/office/drawing/2014/main" id="{C4D956AD-DB54-4B64-977A-7BDCB24614B6}"/>
+              </a:ext>
+            </a:extLst>
+          </p:cNvPr>
+          <p:cNvSpPr>
+            <a:spLocks noGrp="1"/>
+          </p:cNvSpPr>
+          <p:nvPr>
+            <p:ph sz="half" idx="2"/>
+          </p:nvPr>
+        </p:nvSpPr>
+        <p:spPr/>
+        <p:txBody>
+          <a:bodyPr/>
+          <a:lstStyle/>
+          <a:p>
+            <a:endParaRPr lang="hu-HU"/>
+          </a:p>
+        </p:txBody>
+      </p:sp>
+    </p:spTree>
+    <p:extLst>
+      <p:ext uri="{BB962C8B-B14F-4D97-AF65-F5344CB8AC3E}">
+        <p14:creationId xmlns:p14="http://schemas.microsoft.com/office/powerpoint/2010/main" val="3566022571"/>
+      </p:ext>
+    </p:extLst>
+  </p:cSld>
+  <p:clrMapOvr>
+    <a:masterClrMapping/>
+  </p:clrMapOvr>
+  <mc:AlternateContent xmlns:mc="http://schemas.openxmlformats.org/markup-compatibility/2006">
+    <mc:Choice xmlns:p159="http://schemas.microsoft.com/office/powerpoint/2015/09/main" Requires="p159">
+      <p:transition xmlns:p14="http://schemas.microsoft.com/office/powerpoint/2010/main" spd="slow" p14:dur="2000">
+        <p159:morph option="byObject"/>
+      </p:transition>
+    </mc:Choice>
+    <mc:Fallback>
+      <p:transition spd="slow">
+        <p:fade/>
+      </p:transition>
+    </mc:Fallback>
+  </mc:AlternateContent>
+  <p:timing>
+    <p:tnLst>
+      <p:par>
+        <p:cTn id="1" dur="indefinite" restart="never" nodeType="tmRoot">
+          <p:childTnLst>
+            <p:seq concurrent="1" nextAc="seek">
+              <p:cTn id="2" dur="indefinite" nodeType="mainSeq">
+                <p:childTnLst>
+                  <p:par>
+                    <p:cTn id="3" fill="hold">
+                      <p:stCondLst>
+                        <p:cond delay="indefinite"/>
+                      </p:stCondLst>
+                      <p:childTnLst>
+                        <p:par>
+                          <p:cTn id="4" fill="hold">
+                            <p:stCondLst>
+                              <p:cond delay="0"/>
+                            </p:stCondLst>
+                            <p:childTnLst>
+                              <p:par>
+                                <p:cTn id="5" presetID="2" presetClass="entr" presetSubtype="8" fill="hold" grpId="0" nodeType="clickEffect">
+                                  <p:stCondLst>
+                                    <p:cond delay="0"/>
+                                  </p:stCondLst>
+                                  <p:childTnLst>
+                                    <p:set>
+                                      <p:cBhvr>
+                                        <p:cTn id="6" dur="1" fill="hold">
+                                          <p:stCondLst>
+                                            <p:cond delay="0"/>
+                                          </p:stCondLst>
+                                        </p:cTn>
+                                        <p:tgtEl>
+                                          <p:spTgt spid="3">
+                                            <p:txEl>
+                                              <p:pRg st="0" end="0"/>
+                                            </p:txEl>
+                                          </p:spTgt>
+                                        </p:tgtEl>
+                                        <p:attrNameLst>
+                                          <p:attrName>style.visibility</p:attrName>
+                                        </p:attrNameLst>
+                                      </p:cBhvr>
+                                      <p:to>
+                                        <p:strVal val="visible"/>
+                                      </p:to>
+                                    </p:set>
+                                    <p:anim calcmode="lin" valueType="num">
+                                      <p:cBhvr additive="base">
+                                        <p:cTn id="7" dur="500" fill="hold"/>
+                                        <p:tgtEl>
+                                          <p:spTgt spid="3">
+                                            <p:txEl>
+                                              <p:pRg st="0" end="0"/>
+                                            </p:txEl>
+                                          </p:spTgt>
+                                        </p:tgtEl>
+                                        <p:attrNameLst>
+                                          <p:attrName>ppt_x</p:attrName>
+                                        </p:attrNameLst>
+                                      </p:cBhvr>
+                                      <p:tavLst>
+                                        <p:tav tm="0">
+                                          <p:val>
+                                            <p:strVal val="0-#ppt_w/2"/>
+                                          </p:val>
+                                        </p:tav>
+                                        <p:tav tm="100000">
+                                          <p:val>
+                                            <p:strVal val="#ppt_x"/>
+                                          </p:val>
+                                        </p:tav>
+                                      </p:tavLst>
+                                    </p:anim>
+                                    <p:anim calcmode="lin" valueType="num">
+                                      <p:cBhvr additive="base">
+                                        <p:cTn id="8" dur="500" fill="hold"/>
+                                        <p:tgtEl>
+                                          <p:spTgt spid="3">
+                                            <p:txEl>
+                                              <p:pRg st="0" end="0"/>
+                                            </p:txEl>
+                                          </p:spTgt>
+                                        </p:tgtEl>
+                                        <p:attrNameLst>
+                                          <p:attrName>ppt_y</p:attrName>
+                                        </p:attrNameLst>
+                                      </p:cBhvr>
+                                      <p:tavLst>
+                                        <p:tav tm="0">
+                                          <p:val>
+                                            <p:strVal val="#ppt_y"/>
+                                          </p:val>
+                                        </p:tav>
+                                        <p:tav tm="100000">
+                                          <p:val>
+                                            <p:strVal val="#ppt_y"/>
+                                          </p:val>
+                                        </p:tav>
+                                      </p:tavLst>
+                                    </p:anim>
+                                  </p:childTnLst>
+                                </p:cTn>
+                              </p:par>
+                            </p:childTnLst>
+                          </p:cTn>
+                        </p:par>
+                      </p:childTnLst>
+                    </p:cTn>
+                  </p:par>
+                  <p:par>
+                    <p:cTn id="9" fill="hold">
+                      <p:stCondLst>
+                        <p:cond delay="indefinite"/>
+                      </p:stCondLst>
+                      <p:childTnLst>
+                        <p:par>
+                          <p:cTn id="10" fill="hold">
+                            <p:stCondLst>
+                              <p:cond delay="0"/>
+                            </p:stCondLst>
+                            <p:childTnLst>
+                              <p:par>
+                                <p:cTn id="11" presetID="2" presetClass="entr" presetSubtype="8" fill="hold" grpId="0" nodeType="clickEffect">
+                                  <p:stCondLst>
+                                    <p:cond delay="0"/>
+                                  </p:stCondLst>
+                                  <p:childTnLst>
+                                    <p:set>
+                                      <p:cBhvr>
+                                        <p:cTn id="12" dur="1" fill="hold">
+                                          <p:stCondLst>
+                                            <p:cond delay="0"/>
+                                          </p:stCondLst>
+                                        </p:cTn>
+                                        <p:tgtEl>
+                                          <p:spTgt spid="3">
+                                            <p:txEl>
+                                              <p:pRg st="1" end="1"/>
+                                            </p:txEl>
+                                          </p:spTgt>
+                                        </p:tgtEl>
+                                        <p:attrNameLst>
+                                          <p:attrName>style.visibility</p:attrName>
+                                        </p:attrNameLst>
+                                      </p:cBhvr>
+                                      <p:to>
+                                        <p:strVal val="visible"/>
+                                      </p:to>
+                                    </p:set>
+                                    <p:anim calcmode="lin" valueType="num">
+                                      <p:cBhvr additive="base">
+                                        <p:cTn id="13" dur="500" fill="hold"/>
+                                        <p:tgtEl>
+                                          <p:spTgt spid="3">
+                                            <p:txEl>
+                                              <p:pRg st="1" end="1"/>
+                                            </p:txEl>
+                                          </p:spTgt>
+                                        </p:tgtEl>
+                                        <p:attrNameLst>
+                                          <p:attrName>ppt_x</p:attrName>
+                                        </p:attrNameLst>
+                                      </p:cBhvr>
+                                      <p:tavLst>
+                                        <p:tav tm="0">
+                                          <p:val>
+                                            <p:strVal val="0-#ppt_w/2"/>
+                                          </p:val>
+                                        </p:tav>
+                                        <p:tav tm="100000">
+                                          <p:val>
+                                            <p:strVal val="#ppt_x"/>
+                                          </p:val>
+                                        </p:tav>
+                                      </p:tavLst>
+                                    </p:anim>
+                                    <p:anim calcmode="lin" valueType="num">
+                                      <p:cBhvr additive="base">
+                                        <p:cTn id="14" dur="500" fill="hold"/>
+                                        <p:tgtEl>
+                                          <p:spTgt spid="3">
+                                            <p:txEl>
+                                              <p:pRg st="1" end="1"/>
+                                            </p:txEl>
+                                          </p:spTgt>
+                                        </p:tgtEl>
+                                        <p:attrNameLst>
+                                          <p:attrName>ppt_y</p:attrName>
+                                        </p:attrNameLst>
+                                      </p:cBhvr>
+                                      <p:tavLst>
+                                        <p:tav tm="0">
+                                          <p:val>
+                                            <p:strVal val="#ppt_y"/>
+                                          </p:val>
+                                        </p:tav>
+                                        <p:tav tm="100000">
+                                          <p:val>
+                                            <p:strVal val="#ppt_y"/>
+                                          </p:val>
+                                        </p:tav>
+                                      </p:tavLst>
+                                    </p:anim>
+                                  </p:childTnLst>
+                                </p:cTn>
+                              </p:par>
+                            </p:childTnLst>
+                          </p:cTn>
+                        </p:par>
+                      </p:childTnLst>
+                    </p:cTn>
+                  </p:par>
+                  <p:par>
+                    <p:cTn id="15" fill="hold">
+                      <p:stCondLst>
+                        <p:cond delay="indefinite"/>
+                      </p:stCondLst>
+                      <p:childTnLst>
+                        <p:par>
+                          <p:cTn id="16" fill="hold">
+                            <p:stCondLst>
+                              <p:cond delay="0"/>
+                            </p:stCondLst>
+                            <p:childTnLst>
+                              <p:par>
+                                <p:cTn id="17" presetID="2" presetClass="entr" presetSubtype="8" fill="hold" grpId="0" nodeType="clickEffect">
+                                  <p:stCondLst>
+                                    <p:cond delay="0"/>
+                                  </p:stCondLst>
+                                  <p:childTnLst>
+                                    <p:set>
+                                      <p:cBhvr>
+                                        <p:cTn id="18" dur="1" fill="hold">
+                                          <p:stCondLst>
+                                            <p:cond delay="0"/>
+                                          </p:stCondLst>
+                                        </p:cTn>
+                                        <p:tgtEl>
+                                          <p:spTgt spid="3">
+                                            <p:txEl>
+                                              <p:pRg st="2" end="2"/>
+                                            </p:txEl>
+                                          </p:spTgt>
+                                        </p:tgtEl>
+                                        <p:attrNameLst>
+                                          <p:attrName>style.visibility</p:attrName>
+                                        </p:attrNameLst>
+                                      </p:cBhvr>
+                                      <p:to>
+                                        <p:strVal val="visible"/>
+                                      </p:to>
+                                    </p:set>
+                                    <p:anim calcmode="lin" valueType="num">
+                                      <p:cBhvr additive="base">
+                                        <p:cTn id="19" dur="500" fill="hold"/>
+                                        <p:tgtEl>
+                                          <p:spTgt spid="3">
+                                            <p:txEl>
+                                              <p:pRg st="2" end="2"/>
+                                            </p:txEl>
+                                          </p:spTgt>
+                                        </p:tgtEl>
+                                        <p:attrNameLst>
+                                          <p:attrName>ppt_x</p:attrName>
+                                        </p:attrNameLst>
+                                      </p:cBhvr>
+                                      <p:tavLst>
+                                        <p:tav tm="0">
+                                          <p:val>
+                                            <p:strVal val="0-#ppt_w/2"/>
+                                          </p:val>
+                                        </p:tav>
+                                        <p:tav tm="100000">
+                                          <p:val>
+                                            <p:strVal val="#ppt_x"/>
+                                          </p:val>
+                                        </p:tav>
+                                      </p:tavLst>
+                                    </p:anim>
+                                    <p:anim calcmode="lin" valueType="num">
+                                      <p:cBhvr additive="base">
+                                        <p:cTn id="20" dur="500" fill="hold"/>
+                                        <p:tgtEl>
+                                          <p:spTgt spid="3">
+                                            <p:txEl>
+                                              <p:pRg st="2" end="2"/>
+                                            </p:txEl>
+                                          </p:spTgt>
+                                        </p:tgtEl>
+                                        <p:attrNameLst>
+                                          <p:attrName>ppt_y</p:attrName>
+                                        </p:attrNameLst>
+                                      </p:cBhvr>
+                                      <p:tavLst>
+                                        <p:tav tm="0">
+                                          <p:val>
+                                            <p:strVal val="#ppt_y"/>
+                                          </p:val>
+                                        </p:tav>
+                                        <p:tav tm="100000">
+                                          <p:val>
+                                            <p:strVal val="#ppt_y"/>
+                                          </p:val>
+                                        </p:tav>
+                                      </p:tavLst>
+                                    </p:anim>
+                                  </p:childTnLst>
+                                </p:cTn>
+                              </p:par>
+                            </p:childTnLst>
+                          </p:cTn>
+                        </p:par>
+                      </p:childTnLst>
+                    </p:cTn>
+                  </p:par>
+                  <p:par>
+                    <p:cTn id="21" fill="hold">
+                      <p:stCondLst>
+                        <p:cond delay="indefinite"/>
+                      </p:stCondLst>
+                      <p:childTnLst>
+                        <p:par>
+                          <p:cTn id="22" fill="hold">
+                            <p:stCondLst>
+                              <p:cond delay="0"/>
+                            </p:stCondLst>
+                            <p:childTnLst>
+                              <p:par>
+                                <p:cTn id="23" presetID="2" presetClass="entr" presetSubtype="8" fill="hold" grpId="0" nodeType="clickEffect">
+                                  <p:stCondLst>
+                                    <p:cond delay="0"/>
+                                  </p:stCondLst>
+                                  <p:childTnLst>
+                                    <p:set>
+                                      <p:cBhvr>
+                                        <p:cTn id="24" dur="1" fill="hold">
+                                          <p:stCondLst>
+                                            <p:cond delay="0"/>
+                                          </p:stCondLst>
+                                        </p:cTn>
+                                        <p:tgtEl>
+                                          <p:spTgt spid="3">
+                                            <p:txEl>
+                                              <p:pRg st="3" end="3"/>
+                                            </p:txEl>
+                                          </p:spTgt>
+                                        </p:tgtEl>
+                                        <p:attrNameLst>
+                                          <p:attrName>style.visibility</p:attrName>
+                                        </p:attrNameLst>
+                                      </p:cBhvr>
+                                      <p:to>
+                                        <p:strVal val="visible"/>
+                                      </p:to>
+                                    </p:set>
+                                    <p:anim calcmode="lin" valueType="num">
+                                      <p:cBhvr additive="base">
+                                        <p:cTn id="25" dur="500" fill="hold"/>
+                                        <p:tgtEl>
+                                          <p:spTgt spid="3">
+                                            <p:txEl>
+                                              <p:pRg st="3" end="3"/>
+                                            </p:txEl>
+                                          </p:spTgt>
+                                        </p:tgtEl>
+                                        <p:attrNameLst>
+                                          <p:attrName>ppt_x</p:attrName>
+                                        </p:attrNameLst>
+                                      </p:cBhvr>
+                                      <p:tavLst>
+                                        <p:tav tm="0">
+                                          <p:val>
+                                            <p:strVal val="0-#ppt_w/2"/>
+                                          </p:val>
+                                        </p:tav>
+                                        <p:tav tm="100000">
+                                          <p:val>
+                                            <p:strVal val="#ppt_x"/>
+                                          </p:val>
+                                        </p:tav>
+                                      </p:tavLst>
+                                    </p:anim>
+                                    <p:anim calcmode="lin" valueType="num">
+                                      <p:cBhvr additive="base">
+                                        <p:cTn id="26" dur="500" fill="hold"/>
+                                        <p:tgtEl>
+                                          <p:spTgt spid="3">
+                                            <p:txEl>
+                                              <p:pRg st="3" end="3"/>
+                                            </p:txEl>
+                                          </p:spTgt>
+                                        </p:tgtEl>
+                                        <p:attrNameLst>
+                                          <p:attrName>ppt_y</p:attrName>
+                                        </p:attrNameLst>
+                                      </p:cBhvr>
+                                      <p:tavLst>
+                                        <p:tav tm="0">
+                                          <p:val>
+                                            <p:strVal val="#ppt_y"/>
+                                          </p:val>
+                                        </p:tav>
+                                        <p:tav tm="100000">
+                                          <p:val>
+                                            <p:strVal val="#ppt_y"/>
+                                          </p:val>
+                                        </p:tav>
+                                      </p:tavLst>
+                                    </p:anim>
+                                  </p:childTnLst>
+                                </p:cTn>
+                              </p:par>
+                            </p:childTnLst>
+                          </p:cTn>
+                        </p:par>
+                      </p:childTnLst>
+                    </p:cTn>
+                  </p:par>
+                </p:childTnLst>
+              </p:cTn>
+              <p:prevCondLst>
+                <p:cond evt="onPrev" delay="0">
+                  <p:tgtEl>
+                    <p:sldTgt/>
+                  </p:tgtEl>
+                </p:cond>
+              </p:prevCondLst>
+              <p:nextCondLst>
+                <p:cond evt="onNext" delay="0">
+                  <p:tgtEl>
+                    <p:sldTgt/>
+                  </p:tgtEl>
+                </p:cond>
+              </p:nextCondLst>
+            </p:seq>
+          </p:childTnLst>
+        </p:cTn>
+      </p:par>
+    </p:tnLst>
+    <p:bldLst>
+      <p:bldP spid="3" grpId="0" build="p"/>
+    </p:bldLst>
+  </p:timing>
 </p:sld>
 </file>
 

</xml_diff>